<commit_message>
Apprestação de primeria etapa
</commit_message>
<xml_diff>
--- a/Ppt-Andamento.pptx
+++ b/Ppt-Andamento.pptx
@@ -12236,7 +12236,7 @@
 <dgm:dataModel xmlns:dgm="http://schemas.openxmlformats.org/drawingml/2006/diagram" xmlns:a="http://schemas.openxmlformats.org/drawingml/2006/main">
   <dgm:ptLst>
     <dgm:pt modelId="{41EDC0B5-5B2E-40F6-A795-26759C403F93}" type="doc">
-      <dgm:prSet loTypeId="urn:microsoft.com/office/officeart/2005/8/layout/target2" loCatId="relationship" qsTypeId="urn:microsoft.com/office/officeart/2009/2/quickstyle/3d8" qsCatId="3D" csTypeId="urn:microsoft.com/office/officeart/2005/8/colors/accent1_2" csCatId="accent1" phldr="1"/>
+      <dgm:prSet loTypeId="urn:microsoft.com/office/officeart/2005/8/layout/target2" loCatId="relationship" qsTypeId="urn:microsoft.com/office/officeart/2005/8/quickstyle/3d2" qsCatId="3D" csTypeId="urn:microsoft.com/office/officeart/2005/8/colors/accent1_2" csCatId="accent1" phldr="1"/>
       <dgm:spPr/>
       <dgm:t>
         <a:bodyPr/>
@@ -20223,14 +20223,41 @@
             <a:gd name="adj" fmla="val 8500"/>
           </a:avLst>
         </a:prstGeom>
-        <a:solidFill>
-          <a:schemeClr val="accent1">
-            <a:hueOff val="0"/>
-            <a:satOff val="0"/>
-            <a:lumOff val="0"/>
-            <a:alphaOff val="0"/>
-          </a:schemeClr>
-        </a:solidFill>
+        <a:gradFill rotWithShape="0">
+          <a:gsLst>
+            <a:gs pos="0">
+              <a:schemeClr val="accent1">
+                <a:hueOff val="0"/>
+                <a:satOff val="0"/>
+                <a:lumOff val="0"/>
+                <a:alphaOff val="0"/>
+                <a:shade val="51000"/>
+                <a:satMod val="130000"/>
+              </a:schemeClr>
+            </a:gs>
+            <a:gs pos="80000">
+              <a:schemeClr val="accent1">
+                <a:hueOff val="0"/>
+                <a:satOff val="0"/>
+                <a:lumOff val="0"/>
+                <a:alphaOff val="0"/>
+                <a:shade val="93000"/>
+                <a:satMod val="130000"/>
+              </a:schemeClr>
+            </a:gs>
+            <a:gs pos="100000">
+              <a:schemeClr val="accent1">
+                <a:hueOff val="0"/>
+                <a:satOff val="0"/>
+                <a:lumOff val="0"/>
+                <a:alphaOff val="0"/>
+                <a:shade val="94000"/>
+                <a:satMod val="135000"/>
+              </a:schemeClr>
+            </a:gs>
+          </a:gsLst>
+          <a:lin ang="16200000" scaled="0"/>
+        </a:gradFill>
         <a:ln>
           <a:noFill/>
         </a:ln>
@@ -20241,19 +20268,21 @@
             </a:srgbClr>
           </a:outerShdw>
         </a:effectLst>
-        <a:sp3d extrusionH="190500" prstMaterial="matte">
-          <a:bevelT w="120650" h="38100" prst="relaxedInset"/>
-          <a:bevelB w="120650" h="57150" prst="relaxedInset"/>
-          <a:contourClr>
-            <a:schemeClr val="bg1"/>
-          </a:contourClr>
+        <a:scene3d>
+          <a:camera prst="orthographicFront"/>
+          <a:lightRig rig="threePt" dir="t">
+            <a:rot lat="0" lon="0" rev="7500000"/>
+          </a:lightRig>
+        </a:scene3d>
+        <a:sp3d prstMaterial="plastic">
+          <a:bevelT w="127000" h="25400" prst="relaxedInset"/>
         </a:sp3d>
       </dsp:spPr>
       <dsp:style>
         <a:lnRef idx="0">
           <a:scrgbClr r="0" g="0" b="0"/>
         </a:lnRef>
-        <a:fillRef idx="1">
+        <a:fillRef idx="3">
           <a:scrgbClr r="0" g="0" b="0"/>
         </a:fillRef>
         <a:effectRef idx="2">
@@ -20316,8 +20345,16 @@
             <a:alphaOff val="0"/>
           </a:schemeClr>
         </a:solidFill>
-        <a:ln>
-          <a:noFill/>
+        <a:ln w="9525" cap="flat" cmpd="sng" algn="ctr">
+          <a:solidFill>
+            <a:schemeClr val="accent1">
+              <a:hueOff val="0"/>
+              <a:satOff val="0"/>
+              <a:lumOff val="0"/>
+              <a:alphaOff val="0"/>
+            </a:schemeClr>
+          </a:solidFill>
+          <a:prstDash val="solid"/>
         </a:ln>
         <a:effectLst>
           <a:outerShdw blurRad="40000" dist="23000" dir="5400000" rotWithShape="0">
@@ -20326,15 +20363,21 @@
             </a:srgbClr>
           </a:outerShdw>
         </a:effectLst>
-        <a:sp3d z="152400" extrusionH="63500" prstMaterial="matte">
-          <a:bevelT w="50800" h="19050" prst="relaxedInset"/>
+        <a:scene3d>
+          <a:camera prst="orthographicFront"/>
+          <a:lightRig rig="threePt" dir="t">
+            <a:rot lat="0" lon="0" rev="7500000"/>
+          </a:lightRig>
+        </a:scene3d>
+        <a:sp3d z="152400" extrusionH="63500" prstMaterial="dkEdge">
+          <a:bevelT w="135400" h="16350" prst="relaxedInset"/>
           <a:contourClr>
             <a:schemeClr val="bg1"/>
           </a:contourClr>
         </a:sp3d>
       </dsp:spPr>
       <dsp:style>
-        <a:lnRef idx="0">
+        <a:lnRef idx="1">
           <a:scrgbClr r="0" g="0" b="0"/>
         </a:lnRef>
         <a:fillRef idx="1">
@@ -20389,14 +20432,41 @@
             <a:gd name="adj" fmla="val 10500"/>
           </a:avLst>
         </a:prstGeom>
-        <a:solidFill>
-          <a:schemeClr val="accent1">
-            <a:hueOff val="0"/>
-            <a:satOff val="0"/>
-            <a:lumOff val="0"/>
-            <a:alphaOff val="0"/>
-          </a:schemeClr>
-        </a:solidFill>
+        <a:gradFill rotWithShape="0">
+          <a:gsLst>
+            <a:gs pos="0">
+              <a:schemeClr val="accent1">
+                <a:hueOff val="0"/>
+                <a:satOff val="0"/>
+                <a:lumOff val="0"/>
+                <a:alphaOff val="0"/>
+                <a:shade val="51000"/>
+                <a:satMod val="130000"/>
+              </a:schemeClr>
+            </a:gs>
+            <a:gs pos="80000">
+              <a:schemeClr val="accent1">
+                <a:hueOff val="0"/>
+                <a:satOff val="0"/>
+                <a:lumOff val="0"/>
+                <a:alphaOff val="0"/>
+                <a:shade val="93000"/>
+                <a:satMod val="130000"/>
+              </a:schemeClr>
+            </a:gs>
+            <a:gs pos="100000">
+              <a:schemeClr val="accent1">
+                <a:hueOff val="0"/>
+                <a:satOff val="0"/>
+                <a:lumOff val="0"/>
+                <a:alphaOff val="0"/>
+                <a:shade val="94000"/>
+                <a:satMod val="135000"/>
+              </a:schemeClr>
+            </a:gs>
+          </a:gsLst>
+          <a:lin ang="16200000" scaled="0"/>
+        </a:gradFill>
         <a:ln>
           <a:noFill/>
         </a:ln>
@@ -20407,19 +20477,21 @@
             </a:srgbClr>
           </a:outerShdw>
         </a:effectLst>
-        <a:sp3d extrusionH="190500" prstMaterial="matte">
-          <a:bevelT w="120650" h="38100" prst="relaxedInset"/>
-          <a:bevelB w="120650" h="57150" prst="relaxedInset"/>
-          <a:contourClr>
-            <a:schemeClr val="bg1"/>
-          </a:contourClr>
+        <a:scene3d>
+          <a:camera prst="orthographicFront"/>
+          <a:lightRig rig="threePt" dir="t">
+            <a:rot lat="0" lon="0" rev="7500000"/>
+          </a:lightRig>
+        </a:scene3d>
+        <a:sp3d prstMaterial="plastic">
+          <a:bevelT w="127000" h="25400" prst="relaxedInset"/>
         </a:sp3d>
       </dsp:spPr>
       <dsp:style>
         <a:lnRef idx="0">
           <a:scrgbClr r="0" g="0" b="0"/>
         </a:lnRef>
-        <a:fillRef idx="1">
+        <a:fillRef idx="3">
           <a:scrgbClr r="0" g="0" b="0"/>
         </a:fillRef>
         <a:effectRef idx="2">
@@ -20482,8 +20554,16 @@
             <a:alphaOff val="0"/>
           </a:schemeClr>
         </a:solidFill>
-        <a:ln>
-          <a:noFill/>
+        <a:ln w="9525" cap="flat" cmpd="sng" algn="ctr">
+          <a:solidFill>
+            <a:schemeClr val="accent1">
+              <a:hueOff val="0"/>
+              <a:satOff val="0"/>
+              <a:lumOff val="0"/>
+              <a:alphaOff val="0"/>
+            </a:schemeClr>
+          </a:solidFill>
+          <a:prstDash val="solid"/>
         </a:ln>
         <a:effectLst>
           <a:outerShdw blurRad="40000" dist="23000" dir="5400000" rotWithShape="0">
@@ -20492,15 +20572,21 @@
             </a:srgbClr>
           </a:outerShdw>
         </a:effectLst>
-        <a:sp3d z="152400" extrusionH="63500" prstMaterial="matte">
-          <a:bevelT w="50800" h="19050" prst="relaxedInset"/>
+        <a:scene3d>
+          <a:camera prst="orthographicFront"/>
+          <a:lightRig rig="threePt" dir="t">
+            <a:rot lat="0" lon="0" rev="7500000"/>
+          </a:lightRig>
+        </a:scene3d>
+        <a:sp3d z="152400" extrusionH="63500" prstMaterial="dkEdge">
+          <a:bevelT w="135400" h="16350" prst="relaxedInset"/>
           <a:contourClr>
             <a:schemeClr val="bg1"/>
           </a:contourClr>
         </a:sp3d>
       </dsp:spPr>
       <dsp:style>
-        <a:lnRef idx="0">
+        <a:lnRef idx="1">
           <a:scrgbClr r="0" g="0" b="0"/>
         </a:lnRef>
         <a:fillRef idx="1">
@@ -20555,14 +20641,41 @@
             <a:gd name="adj" fmla="val 10500"/>
           </a:avLst>
         </a:prstGeom>
-        <a:solidFill>
-          <a:schemeClr val="accent1">
-            <a:hueOff val="0"/>
-            <a:satOff val="0"/>
-            <a:lumOff val="0"/>
-            <a:alphaOff val="0"/>
-          </a:schemeClr>
-        </a:solidFill>
+        <a:gradFill rotWithShape="0">
+          <a:gsLst>
+            <a:gs pos="0">
+              <a:schemeClr val="accent1">
+                <a:hueOff val="0"/>
+                <a:satOff val="0"/>
+                <a:lumOff val="0"/>
+                <a:alphaOff val="0"/>
+                <a:shade val="51000"/>
+                <a:satMod val="130000"/>
+              </a:schemeClr>
+            </a:gs>
+            <a:gs pos="80000">
+              <a:schemeClr val="accent1">
+                <a:hueOff val="0"/>
+                <a:satOff val="0"/>
+                <a:lumOff val="0"/>
+                <a:alphaOff val="0"/>
+                <a:shade val="93000"/>
+                <a:satMod val="130000"/>
+              </a:schemeClr>
+            </a:gs>
+            <a:gs pos="100000">
+              <a:schemeClr val="accent1">
+                <a:hueOff val="0"/>
+                <a:satOff val="0"/>
+                <a:lumOff val="0"/>
+                <a:alphaOff val="0"/>
+                <a:shade val="94000"/>
+                <a:satMod val="135000"/>
+              </a:schemeClr>
+            </a:gs>
+          </a:gsLst>
+          <a:lin ang="16200000" scaled="0"/>
+        </a:gradFill>
         <a:ln>
           <a:noFill/>
         </a:ln>
@@ -20573,19 +20686,21 @@
             </a:srgbClr>
           </a:outerShdw>
         </a:effectLst>
-        <a:sp3d extrusionH="190500" prstMaterial="matte">
-          <a:bevelT w="120650" h="38100" prst="relaxedInset"/>
-          <a:bevelB w="120650" h="57150" prst="relaxedInset"/>
-          <a:contourClr>
-            <a:schemeClr val="bg1"/>
-          </a:contourClr>
+        <a:scene3d>
+          <a:camera prst="orthographicFront"/>
+          <a:lightRig rig="threePt" dir="t">
+            <a:rot lat="0" lon="0" rev="7500000"/>
+          </a:lightRig>
+        </a:scene3d>
+        <a:sp3d prstMaterial="plastic">
+          <a:bevelT w="127000" h="25400" prst="relaxedInset"/>
         </a:sp3d>
       </dsp:spPr>
       <dsp:style>
         <a:lnRef idx="0">
           <a:scrgbClr r="0" g="0" b="0"/>
         </a:lnRef>
-        <a:fillRef idx="1">
+        <a:fillRef idx="3">
           <a:scrgbClr r="0" g="0" b="0"/>
         </a:fillRef>
         <a:effectRef idx="2">
@@ -20648,8 +20763,16 @@
             <a:alphaOff val="0"/>
           </a:schemeClr>
         </a:solidFill>
-        <a:ln>
-          <a:noFill/>
+        <a:ln w="9525" cap="flat" cmpd="sng" algn="ctr">
+          <a:solidFill>
+            <a:schemeClr val="accent1">
+              <a:hueOff val="0"/>
+              <a:satOff val="0"/>
+              <a:lumOff val="0"/>
+              <a:alphaOff val="0"/>
+            </a:schemeClr>
+          </a:solidFill>
+          <a:prstDash val="solid"/>
         </a:ln>
         <a:effectLst>
           <a:outerShdw blurRad="40000" dist="23000" dir="5400000" rotWithShape="0">
@@ -20658,15 +20781,21 @@
             </a:srgbClr>
           </a:outerShdw>
         </a:effectLst>
-        <a:sp3d z="152400" extrusionH="63500" prstMaterial="matte">
-          <a:bevelT w="50800" h="19050" prst="relaxedInset"/>
+        <a:scene3d>
+          <a:camera prst="orthographicFront"/>
+          <a:lightRig rig="threePt" dir="t">
+            <a:rot lat="0" lon="0" rev="7500000"/>
+          </a:lightRig>
+        </a:scene3d>
+        <a:sp3d z="152400" extrusionH="63500" prstMaterial="dkEdge">
+          <a:bevelT w="135400" h="16350" prst="relaxedInset"/>
           <a:contourClr>
             <a:schemeClr val="bg1"/>
           </a:contourClr>
         </a:sp3d>
       </dsp:spPr>
       <dsp:style>
-        <a:lnRef idx="0">
+        <a:lnRef idx="1">
           <a:scrgbClr r="0" g="0" b="0"/>
         </a:lnRef>
         <a:fillRef idx="1">
@@ -31800,38 +31929,32 @@
 </file>
 
 <file path=ppt/diagrams/quickStyle8.xml><?xml version="1.0" encoding="utf-8"?>
-<dgm:styleDef xmlns:dgm="http://schemas.openxmlformats.org/drawingml/2006/diagram" xmlns:a="http://schemas.openxmlformats.org/drawingml/2006/main" uniqueId="urn:microsoft.com/office/officeart/2009/2/quickstyle/3d8">
+<dgm:styleDef xmlns:dgm="http://schemas.openxmlformats.org/drawingml/2006/diagram" xmlns:a="http://schemas.openxmlformats.org/drawingml/2006/main" uniqueId="urn:microsoft.com/office/officeart/2005/8/quickstyle/3d2">
   <dgm:title val=""/>
   <dgm:desc val=""/>
   <dgm:catLst>
-    <dgm:cat type="3D" pri="11800"/>
+    <dgm:cat type="3D" pri="11200"/>
   </dgm:catLst>
   <dgm:scene3d>
-    <a:camera prst="perspectiveHeroicExtremeRightFacing" zoom="82000">
-      <a:rot lat="21300000" lon="20400000" rev="180000"/>
-    </a:camera>
-    <a:lightRig rig="morning" dir="t">
-      <a:rot lat="0" lon="0" rev="20400000"/>
-    </a:lightRig>
+    <a:camera prst="orthographicFront"/>
+    <a:lightRig rig="threePt" dir="t"/>
   </dgm:scene3d>
   <dgm:styleLbl name="node0">
     <dgm:scene3d>
       <a:camera prst="orthographicFront"/>
-      <a:lightRig rig="threePt" dir="t"/>
+      <a:lightRig rig="threePt" dir="t">
+        <a:rot lat="0" lon="0" rev="7500000"/>
+      </a:lightRig>
     </dgm:scene3d>
-    <dgm:sp3d extrusionH="190500" prstMaterial="matte">
-      <a:bevelT w="120650" h="38100" prst="relaxedInset"/>
-      <a:bevelB w="120650" h="57150" prst="relaxedInset"/>
-      <a:contourClr>
-        <a:schemeClr val="bg1"/>
-      </a:contourClr>
+    <dgm:sp3d prstMaterial="plastic">
+      <a:bevelT w="127000" h="25400" prst="relaxedInset"/>
     </dgm:sp3d>
     <dgm:txPr/>
     <dgm:style>
       <a:lnRef idx="0">
         <a:scrgbClr r="0" g="0" b="0"/>
       </a:lnRef>
-      <a:fillRef idx="1">
+      <a:fillRef idx="3">
         <a:scrgbClr r="0" g="0" b="0"/>
       </a:fillRef>
       <a:effectRef idx="2">
@@ -31845,21 +31968,19 @@
   <dgm:styleLbl name="lnNode1">
     <dgm:scene3d>
       <a:camera prst="orthographicFront"/>
-      <a:lightRig rig="threePt" dir="t"/>
+      <a:lightRig rig="threePt" dir="t">
+        <a:rot lat="0" lon="0" rev="7500000"/>
+      </a:lightRig>
     </dgm:scene3d>
-    <dgm:sp3d extrusionH="190500" prstMaterial="matte">
-      <a:bevelT w="120650" h="38100" prst="relaxedInset"/>
-      <a:bevelB w="120650" h="57150" prst="relaxedInset"/>
-      <a:contourClr>
-        <a:schemeClr val="bg1"/>
-      </a:contourClr>
+    <dgm:sp3d prstMaterial="plastic">
+      <a:bevelT w="127000" h="25400" prst="relaxedInset"/>
     </dgm:sp3d>
     <dgm:txPr/>
     <dgm:style>
-      <a:lnRef idx="0">
+      <a:lnRef idx="1">
         <a:scrgbClr r="0" g="0" b="0"/>
       </a:lnRef>
-      <a:fillRef idx="1">
+      <a:fillRef idx="3">
         <a:scrgbClr r="0" g="0" b="0"/>
       </a:fillRef>
       <a:effectRef idx="2">
@@ -31873,21 +31994,19 @@
   <dgm:styleLbl name="vennNode1">
     <dgm:scene3d>
       <a:camera prst="orthographicFront"/>
-      <a:lightRig rig="threePt" dir="t"/>
+      <a:lightRig rig="threePt" dir="t">
+        <a:rot lat="0" lon="0" rev="7500000"/>
+      </a:lightRig>
     </dgm:scene3d>
-    <dgm:sp3d extrusionH="190500" prstMaterial="matte">
-      <a:bevelT w="120650" h="38100" prst="relaxedInset"/>
-      <a:bevelB w="120650" h="57150" prst="relaxedInset"/>
-      <a:contourClr>
-        <a:schemeClr val="bg1"/>
-      </a:contourClr>
+    <dgm:sp3d prstMaterial="plastic">
+      <a:bevelT w="127000" h="25400" prst="relaxedInset"/>
     </dgm:sp3d>
     <dgm:txPr/>
     <dgm:style>
       <a:lnRef idx="0">
         <a:scrgbClr r="0" g="0" b="0"/>
       </a:lnRef>
-      <a:fillRef idx="1">
+      <a:fillRef idx="3">
         <a:scrgbClr r="0" g="0" b="0"/>
       </a:fillRef>
       <a:effectRef idx="2">
@@ -31898,24 +32017,22 @@
       </a:fontRef>
     </dgm:style>
   </dgm:styleLbl>
-  <dgm:styleLbl name="alignNode1">
+  <dgm:styleLbl name="alingNode1">
     <dgm:scene3d>
       <a:camera prst="orthographicFront"/>
-      <a:lightRig rig="threePt" dir="t"/>
+      <a:lightRig rig="threePt" dir="t">
+        <a:rot lat="0" lon="0" rev="7500000"/>
+      </a:lightRig>
     </dgm:scene3d>
-    <dgm:sp3d extrusionH="190500" prstMaterial="matte">
-      <a:bevelT w="120650" h="38100" prst="relaxedInset"/>
-      <a:bevelB w="120650" h="57150" prst="relaxedInset"/>
-      <a:contourClr>
-        <a:schemeClr val="bg1"/>
-      </a:contourClr>
+    <dgm:sp3d prstMaterial="plastic">
+      <a:bevelT w="127000" h="25400" prst="relaxedInset"/>
     </dgm:sp3d>
     <dgm:txPr/>
     <dgm:style>
       <a:lnRef idx="0">
         <a:scrgbClr r="0" g="0" b="0"/>
       </a:lnRef>
-      <a:fillRef idx="1">
+      <a:fillRef idx="3">
         <a:scrgbClr r="0" g="0" b="0"/>
       </a:fillRef>
       <a:effectRef idx="2">
@@ -31929,21 +32046,19 @@
   <dgm:styleLbl name="node1">
     <dgm:scene3d>
       <a:camera prst="orthographicFront"/>
-      <a:lightRig rig="threePt" dir="t"/>
+      <a:lightRig rig="threePt" dir="t">
+        <a:rot lat="0" lon="0" rev="7500000"/>
+      </a:lightRig>
     </dgm:scene3d>
-    <dgm:sp3d extrusionH="190500" prstMaterial="matte">
-      <a:bevelT w="120650" h="38100" prst="relaxedInset"/>
-      <a:bevelB w="120650" h="57150" prst="relaxedInset"/>
-      <a:contourClr>
-        <a:schemeClr val="bg1"/>
-      </a:contourClr>
+    <dgm:sp3d prstMaterial="plastic">
+      <a:bevelT w="127000" h="25400" prst="relaxedInset"/>
     </dgm:sp3d>
     <dgm:txPr/>
     <dgm:style>
       <a:lnRef idx="0">
         <a:scrgbClr r="0" g="0" b="0"/>
       </a:lnRef>
-      <a:fillRef idx="1">
+      <a:fillRef idx="3">
         <a:scrgbClr r="0" g="0" b="0"/>
       </a:fillRef>
       <a:effectRef idx="2">
@@ -31957,21 +32072,19 @@
   <dgm:styleLbl name="node2">
     <dgm:scene3d>
       <a:camera prst="orthographicFront"/>
-      <a:lightRig rig="threePt" dir="t"/>
+      <a:lightRig rig="threePt" dir="t">
+        <a:rot lat="0" lon="0" rev="7500000"/>
+      </a:lightRig>
     </dgm:scene3d>
-    <dgm:sp3d extrusionH="190500" prstMaterial="matte">
-      <a:bevelT w="120650" h="38100" prst="relaxedInset"/>
-      <a:bevelB w="120650" h="57150" prst="relaxedInset"/>
-      <a:contourClr>
-        <a:schemeClr val="bg1"/>
-      </a:contourClr>
+    <dgm:sp3d prstMaterial="plastic">
+      <a:bevelT w="127000" h="25400" prst="relaxedInset"/>
     </dgm:sp3d>
     <dgm:txPr/>
     <dgm:style>
       <a:lnRef idx="0">
         <a:scrgbClr r="0" g="0" b="0"/>
       </a:lnRef>
-      <a:fillRef idx="1">
+      <a:fillRef idx="3">
         <a:scrgbClr r="0" g="0" b="0"/>
       </a:fillRef>
       <a:effectRef idx="2">
@@ -31985,21 +32098,19 @@
   <dgm:styleLbl name="node3">
     <dgm:scene3d>
       <a:camera prst="orthographicFront"/>
-      <a:lightRig rig="threePt" dir="t"/>
+      <a:lightRig rig="threePt" dir="t">
+        <a:rot lat="0" lon="0" rev="7500000"/>
+      </a:lightRig>
     </dgm:scene3d>
-    <dgm:sp3d extrusionH="190500" prstMaterial="matte">
-      <a:bevelT w="120650" h="38100" prst="relaxedInset"/>
-      <a:bevelB w="120650" h="57150" prst="relaxedInset"/>
-      <a:contourClr>
-        <a:schemeClr val="bg1"/>
-      </a:contourClr>
+    <dgm:sp3d prstMaterial="plastic">
+      <a:bevelT w="127000" h="25400" prst="relaxedInset"/>
     </dgm:sp3d>
     <dgm:txPr/>
     <dgm:style>
       <a:lnRef idx="0">
         <a:scrgbClr r="0" g="0" b="0"/>
       </a:lnRef>
-      <a:fillRef idx="1">
+      <a:fillRef idx="3">
         <a:scrgbClr r="0" g="0" b="0"/>
       </a:fillRef>
       <a:effectRef idx="2">
@@ -32013,21 +32124,19 @@
   <dgm:styleLbl name="node4">
     <dgm:scene3d>
       <a:camera prst="orthographicFront"/>
-      <a:lightRig rig="threePt" dir="t"/>
+      <a:lightRig rig="threePt" dir="t">
+        <a:rot lat="0" lon="0" rev="7500000"/>
+      </a:lightRig>
     </dgm:scene3d>
-    <dgm:sp3d extrusionH="190500" prstMaterial="matte">
-      <a:bevelT w="120650" h="38100" prst="relaxedInset"/>
-      <a:bevelB w="120650" h="57150" prst="relaxedInset"/>
-      <a:contourClr>
-        <a:schemeClr val="bg1"/>
-      </a:contourClr>
+    <dgm:sp3d prstMaterial="plastic">
+      <a:bevelT w="127000" h="25400" prst="relaxedInset"/>
     </dgm:sp3d>
     <dgm:txPr/>
     <dgm:style>
       <a:lnRef idx="0">
         <a:scrgbClr r="0" g="0" b="0"/>
       </a:lnRef>
-      <a:fillRef idx="1">
+      <a:fillRef idx="3">
         <a:scrgbClr r="0" g="0" b="0"/>
       </a:fillRef>
       <a:effectRef idx="2">
@@ -32041,7 +32150,9 @@
   <dgm:styleLbl name="fgImgPlace1">
     <dgm:scene3d>
       <a:camera prst="orthographicFront"/>
-      <a:lightRig rig="threePt" dir="t"/>
+      <a:lightRig rig="threePt" dir="t">
+        <a:rot lat="0" lon="0" rev="7500000"/>
+      </a:lightRig>
     </dgm:scene3d>
     <dgm:sp3d z="152400" extrusionH="63500" prstMaterial="matte">
       <a:bevelT w="50800" h="19050" prst="relaxedInset"/>
@@ -32066,9 +32177,11 @@
   <dgm:styleLbl name="alignImgPlace1">
     <dgm:scene3d>
       <a:camera prst="orthographicFront"/>
-      <a:lightRig rig="threePt" dir="t"/>
+      <a:lightRig rig="threePt" dir="t">
+        <a:rot lat="0" lon="0" rev="7500000"/>
+      </a:lightRig>
     </dgm:scene3d>
-    <dgm:sp3d extrusionH="63500" contourW="12700" prstMaterial="matte">
+    <dgm:sp3d z="254000" extrusionH="63500" contourW="12700" prstMaterial="matte">
       <a:contourClr>
         <a:schemeClr val="lt1"/>
       </a:contourClr>
@@ -32090,10 +32203,38 @@
   <dgm:styleLbl name="bgImgPlace1">
     <dgm:scene3d>
       <a:camera prst="orthographicFront"/>
-      <a:lightRig rig="threePt" dir="t"/>
+      <a:lightRig rig="threePt" dir="t">
+        <a:rot lat="0" lon="0" rev="7500000"/>
+      </a:lightRig>
     </dgm:scene3d>
-    <dgm:sp3d z="-302400" extrusionH="63500" prstMaterial="matte">
-      <a:bevelT w="50800" h="19050" prst="relaxedInset"/>
+    <dgm:sp3d z="-152400" extrusionH="63500" contourW="12700" prstMaterial="matte">
+      <a:contourClr>
+        <a:schemeClr val="lt1"/>
+      </a:contourClr>
+    </dgm:sp3d>
+    <dgm:txPr/>
+    <dgm:style>
+      <a:lnRef idx="0">
+        <a:scrgbClr r="0" g="0" b="0"/>
+      </a:lnRef>
+      <a:fillRef idx="1">
+        <a:scrgbClr r="0" g="0" b="0"/>
+      </a:fillRef>
+      <a:effectRef idx="0">
+        <a:scrgbClr r="0" g="0" b="0"/>
+      </a:effectRef>
+      <a:fontRef idx="minor"/>
+    </dgm:style>
+  </dgm:styleLbl>
+  <dgm:styleLbl name="sibTrans2D1">
+    <dgm:scene3d>
+      <a:camera prst="orthographicFront"/>
+      <a:lightRig rig="threePt" dir="t">
+        <a:rot lat="0" lon="0" rev="7500000"/>
+      </a:lightRig>
+    </dgm:scene3d>
+    <dgm:sp3d z="-70000" extrusionH="63500" prstMaterial="matte">
+      <a:bevelT w="25400" h="6350" prst="relaxedInset"/>
       <a:contourClr>
         <a:schemeClr val="bg1"/>
       </a:contourClr>
@@ -32106,19 +32247,23 @@
       <a:fillRef idx="1">
         <a:scrgbClr r="0" g="0" b="0"/>
       </a:fillRef>
-      <a:effectRef idx="0">
+      <a:effectRef idx="2">
         <a:scrgbClr r="0" g="0" b="0"/>
       </a:effectRef>
-      <a:fontRef idx="minor"/>
+      <a:fontRef idx="minor">
+        <a:schemeClr val="lt1"/>
+      </a:fontRef>
     </dgm:style>
   </dgm:styleLbl>
-  <dgm:styleLbl name="sibTrans2D1">
+  <dgm:styleLbl name="fgSibTrans2D1">
     <dgm:scene3d>
       <a:camera prst="orthographicFront"/>
-      <a:lightRig rig="threePt" dir="t"/>
+      <a:lightRig rig="threePt" dir="t">
+        <a:rot lat="0" lon="0" rev="7500000"/>
+      </a:lightRig>
     </dgm:scene3d>
-    <dgm:sp3d z="-60000" extrusionH="63500" prstMaterial="matte">
-      <a:bevelT w="50800" h="19050" prst="relaxedInset"/>
+    <dgm:sp3d z="152400" extrusionH="63500" prstMaterial="matte">
+      <a:bevelT w="25400" h="6350" prst="relaxedInset"/>
       <a:contourClr>
         <a:schemeClr val="bg1"/>
       </a:contourClr>
@@ -32139,13 +32284,15 @@
       </a:fontRef>
     </dgm:style>
   </dgm:styleLbl>
-  <dgm:styleLbl name="fgSibTrans2D1">
+  <dgm:styleLbl name="bgSibTrans2D1">
     <dgm:scene3d>
       <a:camera prst="orthographicFront"/>
-      <a:lightRig rig="threePt" dir="t"/>
+      <a:lightRig rig="threePt" dir="t">
+        <a:rot lat="0" lon="0" rev="7500000"/>
+      </a:lightRig>
     </dgm:scene3d>
-    <dgm:sp3d z="63500" extrusionH="63500" prstMaterial="matte">
-      <a:bevelT w="50800" h="19050" prst="relaxedInset"/>
+    <dgm:sp3d z="-152400" extrusionH="63500" prstMaterial="matte">
+      <a:bevelT w="25400" h="6350" prst="relaxedInset"/>
       <a:contourClr>
         <a:schemeClr val="bg1"/>
       </a:contourClr>
@@ -32166,23 +32313,66 @@
       </a:fontRef>
     </dgm:style>
   </dgm:styleLbl>
-  <dgm:styleLbl name="bgSibTrans2D1">
+  <dgm:styleLbl name="sibTrans1D1">
     <dgm:scene3d>
       <a:camera prst="orthographicFront"/>
-      <a:lightRig rig="threePt" dir="t"/>
+      <a:lightRig rig="threePt" dir="t">
+        <a:rot lat="0" lon="0" rev="7500000"/>
+      </a:lightRig>
     </dgm:scene3d>
-    <dgm:sp3d z="-152000" extrusionH="63500" prstMaterial="matte">
-      <a:bevelT w="50800" h="19050" prst="relaxedInset"/>
-      <a:contourClr>
-        <a:schemeClr val="bg1"/>
-      </a:contourClr>
+    <dgm:sp3d z="-40000" prstMaterial="matte"/>
+    <dgm:txPr/>
+    <dgm:style>
+      <a:lnRef idx="1">
+        <a:scrgbClr r="0" g="0" b="0"/>
+      </a:lnRef>
+      <a:fillRef idx="0">
+        <a:scrgbClr r="0" g="0" b="0"/>
+      </a:fillRef>
+      <a:effectRef idx="0">
+        <a:scrgbClr r="0" g="0" b="0"/>
+      </a:effectRef>
+      <a:fontRef idx="minor"/>
+    </dgm:style>
+  </dgm:styleLbl>
+  <dgm:styleLbl name="callout">
+    <dgm:scene3d>
+      <a:camera prst="orthographicFront"/>
+      <a:lightRig rig="threePt" dir="t">
+        <a:rot lat="0" lon="0" rev="7500000"/>
+      </a:lightRig>
+    </dgm:scene3d>
+    <dgm:sp3d z="127000" prstMaterial="matte"/>
+    <dgm:txPr/>
+    <dgm:style>
+      <a:lnRef idx="2">
+        <a:scrgbClr r="0" g="0" b="0"/>
+      </a:lnRef>
+      <a:fillRef idx="1">
+        <a:scrgbClr r="0" g="0" b="0"/>
+      </a:fillRef>
+      <a:effectRef idx="0">
+        <a:scrgbClr r="0" g="0" b="0"/>
+      </a:effectRef>
+      <a:fontRef idx="minor"/>
+    </dgm:style>
+  </dgm:styleLbl>
+  <dgm:styleLbl name="asst0">
+    <dgm:scene3d>
+      <a:camera prst="orthographicFront"/>
+      <a:lightRig rig="threePt" dir="t">
+        <a:rot lat="0" lon="0" rev="7500000"/>
+      </a:lightRig>
+    </dgm:scene3d>
+    <dgm:sp3d prstMaterial="plastic">
+      <a:bevelT w="127000" h="25400" prst="relaxedInset"/>
     </dgm:sp3d>
     <dgm:txPr/>
     <dgm:style>
       <a:lnRef idx="0">
         <a:scrgbClr r="0" g="0" b="0"/>
       </a:lnRef>
-      <a:fillRef idx="1">
+      <a:fillRef idx="3">
         <a:scrgbClr r="0" g="0" b="0"/>
       </a:fillRef>
       <a:effectRef idx="2">
@@ -32193,64 +32383,22 @@
       </a:fontRef>
     </dgm:style>
   </dgm:styleLbl>
-  <dgm:styleLbl name="sibTrans1D1">
+  <dgm:styleLbl name="asst1">
     <dgm:scene3d>
       <a:camera prst="orthographicFront"/>
-      <a:lightRig rig="threePt" dir="t"/>
+      <a:lightRig rig="threePt" dir="t">
+        <a:rot lat="0" lon="0" rev="7500000"/>
+      </a:lightRig>
     </dgm:scene3d>
-    <dgm:sp3d z="-40000" prstMaterial="matte"/>
-    <dgm:txPr/>
-    <dgm:style>
-      <a:lnRef idx="1">
-        <a:scrgbClr r="0" g="0" b="0"/>
-      </a:lnRef>
-      <a:fillRef idx="0">
-        <a:scrgbClr r="0" g="0" b="0"/>
-      </a:fillRef>
-      <a:effectRef idx="0">
-        <a:scrgbClr r="0" g="0" b="0"/>
-      </a:effectRef>
-      <a:fontRef idx="minor"/>
-    </dgm:style>
-  </dgm:styleLbl>
-  <dgm:styleLbl name="callout">
-    <dgm:scene3d>
-      <a:camera prst="orthographicFront"/>
-      <a:lightRig rig="threePt" dir="t"/>
-    </dgm:scene3d>
-    <dgm:sp3d z="127000" prstMaterial="matte"/>
-    <dgm:txPr/>
-    <dgm:style>
-      <a:lnRef idx="2">
-        <a:scrgbClr r="0" g="0" b="0"/>
-      </a:lnRef>
-      <a:fillRef idx="1">
-        <a:scrgbClr r="0" g="0" b="0"/>
-      </a:fillRef>
-      <a:effectRef idx="0">
-        <a:scrgbClr r="0" g="0" b="0"/>
-      </a:effectRef>
-      <a:fontRef idx="minor"/>
-    </dgm:style>
-  </dgm:styleLbl>
-  <dgm:styleLbl name="asst0">
-    <dgm:scene3d>
-      <a:camera prst="orthographicFront"/>
-      <a:lightRig rig="threePt" dir="t"/>
-    </dgm:scene3d>
-    <dgm:sp3d extrusionH="190500" prstMaterial="matte">
-      <a:bevelT w="120650" h="38100" prst="relaxedInset"/>
-      <a:bevelB w="120650" h="57150" prst="relaxedInset"/>
-      <a:contourClr>
-        <a:schemeClr val="bg1"/>
-      </a:contourClr>
+    <dgm:sp3d prstMaterial="plastic">
+      <a:bevelT w="127000" h="25400" prst="relaxedInset"/>
     </dgm:sp3d>
     <dgm:txPr/>
     <dgm:style>
       <a:lnRef idx="0">
         <a:scrgbClr r="0" g="0" b="0"/>
       </a:lnRef>
-      <a:fillRef idx="1">
+      <a:fillRef idx="3">
         <a:scrgbClr r="0" g="0" b="0"/>
       </a:fillRef>
       <a:effectRef idx="2">
@@ -32261,24 +32409,22 @@
       </a:fontRef>
     </dgm:style>
   </dgm:styleLbl>
-  <dgm:styleLbl name="asst1">
+  <dgm:styleLbl name="asst2">
     <dgm:scene3d>
       <a:camera prst="orthographicFront"/>
-      <a:lightRig rig="threePt" dir="t"/>
+      <a:lightRig rig="threePt" dir="t">
+        <a:rot lat="0" lon="0" rev="7500000"/>
+      </a:lightRig>
     </dgm:scene3d>
-    <dgm:sp3d extrusionH="190500" prstMaterial="matte">
-      <a:bevelT w="120650" h="38100" prst="relaxedInset"/>
-      <a:bevelB w="120650" h="57150" prst="relaxedInset"/>
-      <a:contourClr>
-        <a:schemeClr val="bg1"/>
-      </a:contourClr>
+    <dgm:sp3d prstMaterial="plastic">
+      <a:bevelT w="127000" h="25400" prst="relaxedInset"/>
     </dgm:sp3d>
     <dgm:txPr/>
     <dgm:style>
       <a:lnRef idx="0">
         <a:scrgbClr r="0" g="0" b="0"/>
       </a:lnRef>
-      <a:fillRef idx="1">
+      <a:fillRef idx="3">
         <a:scrgbClr r="0" g="0" b="0"/>
       </a:fillRef>
       <a:effectRef idx="2">
@@ -32289,24 +32435,22 @@
       </a:fontRef>
     </dgm:style>
   </dgm:styleLbl>
-  <dgm:styleLbl name="asst2">
+  <dgm:styleLbl name="asst3">
     <dgm:scene3d>
       <a:camera prst="orthographicFront"/>
-      <a:lightRig rig="threePt" dir="t"/>
+      <a:lightRig rig="threePt" dir="t">
+        <a:rot lat="0" lon="0" rev="7500000"/>
+      </a:lightRig>
     </dgm:scene3d>
-    <dgm:sp3d extrusionH="190500" prstMaterial="matte">
-      <a:bevelT w="120650" h="38100" prst="relaxedInset"/>
-      <a:bevelB w="120650" h="57150" prst="relaxedInset"/>
-      <a:contourClr>
-        <a:schemeClr val="bg1"/>
-      </a:contourClr>
+    <dgm:sp3d prstMaterial="plastic">
+      <a:bevelT w="127000" h="25400" prst="relaxedInset"/>
     </dgm:sp3d>
     <dgm:txPr/>
     <dgm:style>
       <a:lnRef idx="0">
         <a:scrgbClr r="0" g="0" b="0"/>
       </a:lnRef>
-      <a:fillRef idx="1">
+      <a:fillRef idx="3">
         <a:scrgbClr r="0" g="0" b="0"/>
       </a:fillRef>
       <a:effectRef idx="2">
@@ -32317,38 +32461,12 @@
       </a:fontRef>
     </dgm:style>
   </dgm:styleLbl>
-  <dgm:styleLbl name="asst3">
-    <dgm:scene3d>
-      <a:camera prst="orthographicFront"/>
-      <a:lightRig rig="threePt" dir="t"/>
-    </dgm:scene3d>
-    <dgm:sp3d extrusionH="190500" prstMaterial="matte">
-      <a:bevelT w="120650" h="38100" prst="relaxedInset"/>
-      <a:bevelB w="120650" h="57150" prst="relaxedInset"/>
-      <a:contourClr>
-        <a:schemeClr val="bg1"/>
-      </a:contourClr>
-    </dgm:sp3d>
-    <dgm:txPr/>
-    <dgm:style>
-      <a:lnRef idx="0">
-        <a:scrgbClr r="0" g="0" b="0"/>
-      </a:lnRef>
-      <a:fillRef idx="1">
-        <a:scrgbClr r="0" g="0" b="0"/>
-      </a:fillRef>
-      <a:effectRef idx="2">
-        <a:scrgbClr r="0" g="0" b="0"/>
-      </a:effectRef>
-      <a:fontRef idx="minor">
-        <a:schemeClr val="lt1"/>
-      </a:fontRef>
-    </dgm:style>
-  </dgm:styleLbl>
   <dgm:styleLbl name="parChTrans2D1">
     <dgm:scene3d>
       <a:camera prst="orthographicFront"/>
-      <a:lightRig rig="threePt" dir="t"/>
+      <a:lightRig rig="threePt" dir="t">
+        <a:rot lat="0" lon="0" rev="7500000"/>
+      </a:lightRig>
     </dgm:scene3d>
     <dgm:sp3d extrusionH="63500" prstMaterial="matte">
       <a:bevelT w="50800" h="19050" prst="relaxedInset"/>
@@ -32375,7 +32493,9 @@
   <dgm:styleLbl name="parChTrans2D2">
     <dgm:scene3d>
       <a:camera prst="orthographicFront"/>
-      <a:lightRig rig="threePt" dir="t"/>
+      <a:lightRig rig="threePt" dir="t">
+        <a:rot lat="0" lon="0" rev="7500000"/>
+      </a:lightRig>
     </dgm:scene3d>
     <dgm:sp3d extrusionH="63500" prstMaterial="matte">
       <a:bevelT w="50800" h="19050" prst="relaxedInset"/>
@@ -32402,11 +32522,12 @@
   <dgm:styleLbl name="parChTrans2D3">
     <dgm:scene3d>
       <a:camera prst="orthographicFront"/>
-      <a:lightRig rig="threePt" dir="t"/>
+      <a:lightRig rig="threePt" dir="t">
+        <a:rot lat="0" lon="0" rev="7500000"/>
+      </a:lightRig>
     </dgm:scene3d>
     <dgm:sp3d z="60000" prstMaterial="flat">
       <a:bevelT w="120900" h="88900"/>
-      <a:bevelB w="88900" h="31750" prst="angle"/>
     </dgm:sp3d>
     <dgm:txPr/>
     <dgm:style>
@@ -32427,11 +32548,12 @@
   <dgm:styleLbl name="parChTrans2D4">
     <dgm:scene3d>
       <a:camera prst="orthographicFront"/>
-      <a:lightRig rig="threePt" dir="t"/>
+      <a:lightRig rig="threePt" dir="t">
+        <a:rot lat="0" lon="0" rev="7500000"/>
+      </a:lightRig>
     </dgm:scene3d>
     <dgm:sp3d z="60000" prstMaterial="flat">
       <a:bevelT w="120900" h="88900"/>
-      <a:bevelB w="88900" h="31750" prst="angle"/>
     </dgm:sp3d>
     <dgm:txPr/>
     <dgm:style>
@@ -32452,7 +32574,9 @@
   <dgm:styleLbl name="parChTrans1D1">
     <dgm:scene3d>
       <a:camera prst="orthographicFront"/>
-      <a:lightRig rig="threePt" dir="t"/>
+      <a:lightRig rig="threePt" dir="t">
+        <a:rot lat="0" lon="0" rev="7500000"/>
+      </a:lightRig>
     </dgm:scene3d>
     <dgm:sp3d z="-40000" prstMaterial="matte"/>
     <dgm:txPr/>
@@ -32472,7 +32596,9 @@
   <dgm:styleLbl name="parChTrans1D2">
     <dgm:scene3d>
       <a:camera prst="orthographicFront"/>
-      <a:lightRig rig="threePt" dir="t"/>
+      <a:lightRig rig="threePt" dir="t">
+        <a:rot lat="0" lon="0" rev="7500000"/>
+      </a:lightRig>
     </dgm:scene3d>
     <dgm:sp3d z="-40000" prstMaterial="matte"/>
     <dgm:txPr/>
@@ -32492,7 +32618,9 @@
   <dgm:styleLbl name="parChTrans1D3">
     <dgm:scene3d>
       <a:camera prst="orthographicFront"/>
-      <a:lightRig rig="threePt" dir="t"/>
+      <a:lightRig rig="threePt" dir="t">
+        <a:rot lat="0" lon="0" rev="7500000"/>
+      </a:lightRig>
     </dgm:scene3d>
     <dgm:sp3d z="-40000" prstMaterial="matte"/>
     <dgm:txPr/>
@@ -32512,7 +32640,9 @@
   <dgm:styleLbl name="parChTrans1D4">
     <dgm:scene3d>
       <a:camera prst="orthographicFront"/>
-      <a:lightRig rig="threePt" dir="t"/>
+      <a:lightRig rig="threePt" dir="t">
+        <a:rot lat="0" lon="0" rev="7500000"/>
+      </a:lightRig>
     </dgm:scene3d>
     <dgm:sp3d z="-40000" prstMaterial="matte"/>
     <dgm:txPr/>
@@ -32532,17 +32662,19 @@
   <dgm:styleLbl name="fgAcc1">
     <dgm:scene3d>
       <a:camera prst="orthographicFront"/>
-      <a:lightRig rig="threePt" dir="t"/>
+      <a:lightRig rig="threePt" dir="t">
+        <a:rot lat="0" lon="0" rev="7500000"/>
+      </a:lightRig>
     </dgm:scene3d>
-    <dgm:sp3d z="152400" extrusionH="63500" prstMaterial="matte">
-      <a:bevelT w="50800" h="19050" prst="relaxedInset"/>
+    <dgm:sp3d z="152400" extrusionH="63500" prstMaterial="dkEdge">
+      <a:bevelT w="135400" h="16350" prst="relaxedInset"/>
       <a:contourClr>
         <a:schemeClr val="bg1"/>
       </a:contourClr>
     </dgm:sp3d>
     <dgm:txPr/>
     <dgm:style>
-      <a:lnRef idx="0">
+      <a:lnRef idx="1">
         <a:scrgbClr r="0" g="0" b="0"/>
       </a:lnRef>
       <a:fillRef idx="1">
@@ -32557,23 +32689,25 @@
   <dgm:styleLbl name="conFgAcc1">
     <dgm:scene3d>
       <a:camera prst="orthographicFront"/>
-      <a:lightRig rig="threePt" dir="t"/>
+      <a:lightRig rig="threePt" dir="t">
+        <a:rot lat="0" lon="0" rev="7500000"/>
+      </a:lightRig>
     </dgm:scene3d>
-    <dgm:sp3d z="-152400" extrusionH="63500" prstMaterial="matte">
-      <a:bevelT w="44450" h="6350" prst="relaxedInset"/>
+    <dgm:sp3d z="152400" extrusionH="63500" prstMaterial="dkEdge">
+      <a:bevelT w="135400" h="16350" prst="relaxedInset"/>
       <a:contourClr>
         <a:schemeClr val="bg1"/>
       </a:contourClr>
     </dgm:sp3d>
     <dgm:txPr/>
     <dgm:style>
-      <a:lnRef idx="0">
+      <a:lnRef idx="1">
         <a:scrgbClr r="0" g="0" b="0"/>
       </a:lnRef>
       <a:fillRef idx="1">
         <a:scrgbClr r="0" g="0" b="0"/>
       </a:fillRef>
-      <a:effectRef idx="0">
+      <a:effectRef idx="2">
         <a:scrgbClr r="0" g="0" b="0"/>
       </a:effectRef>
       <a:fontRef idx="minor"/>
@@ -32582,9 +32716,199 @@
   <dgm:styleLbl name="alignAcc1">
     <dgm:scene3d>
       <a:camera prst="orthographicFront"/>
-      <a:lightRig rig="threePt" dir="t"/>
+      <a:lightRig rig="threePt" dir="t">
+        <a:rot lat="0" lon="0" rev="7500000"/>
+      </a:lightRig>
     </dgm:scene3d>
-    <dgm:sp3d extrusionH="190500" prstMaterial="matte">
+    <dgm:sp3d extrusionH="190500" prstMaterial="dkEdge">
+      <a:bevelT w="135400" h="16350" prst="relaxedInset"/>
+      <a:contourClr>
+        <a:schemeClr val="bg1"/>
+      </a:contourClr>
+    </dgm:sp3d>
+    <dgm:txPr/>
+    <dgm:style>
+      <a:lnRef idx="1">
+        <a:scrgbClr r="0" g="0" b="0"/>
+      </a:lnRef>
+      <a:fillRef idx="1">
+        <a:scrgbClr r="0" g="0" b="0"/>
+      </a:fillRef>
+      <a:effectRef idx="2">
+        <a:scrgbClr r="0" g="0" b="0"/>
+      </a:effectRef>
+      <a:fontRef idx="minor"/>
+    </dgm:style>
+  </dgm:styleLbl>
+  <dgm:styleLbl name="trAlignAcc1">
+    <dgm:scene3d>
+      <a:camera prst="orthographicFront"/>
+      <a:lightRig rig="threePt" dir="t">
+        <a:rot lat="0" lon="0" rev="7500000"/>
+      </a:lightRig>
+    </dgm:scene3d>
+    <dgm:sp3d prstMaterial="plastic">
+      <a:bevelT w="127000" h="35400"/>
+    </dgm:sp3d>
+    <dgm:txPr/>
+    <dgm:style>
+      <a:lnRef idx="1">
+        <a:scrgbClr r="0" g="0" b="0"/>
+      </a:lnRef>
+      <a:fillRef idx="1">
+        <a:scrgbClr r="0" g="0" b="0"/>
+      </a:fillRef>
+      <a:effectRef idx="2">
+        <a:scrgbClr r="0" g="0" b="0"/>
+      </a:effectRef>
+      <a:fontRef idx="minor">
+        <a:schemeClr val="lt1"/>
+      </a:fontRef>
+    </dgm:style>
+  </dgm:styleLbl>
+  <dgm:styleLbl name="bgAcc1">
+    <dgm:scene3d>
+      <a:camera prst="orthographicFront"/>
+      <a:lightRig rig="threePt" dir="t">
+        <a:rot lat="0" lon="0" rev="7500000"/>
+      </a:lightRig>
+    </dgm:scene3d>
+    <dgm:sp3d z="-152400" extrusionH="63500" prstMaterial="dkEdge">
+      <a:bevelT w="124450" h="16350" prst="relaxedInset"/>
+      <a:contourClr>
+        <a:schemeClr val="bg1"/>
+      </a:contourClr>
+    </dgm:sp3d>
+    <dgm:txPr/>
+    <dgm:style>
+      <a:lnRef idx="1">
+        <a:scrgbClr r="0" g="0" b="0"/>
+      </a:lnRef>
+      <a:fillRef idx="1">
+        <a:scrgbClr r="0" g="0" b="0"/>
+      </a:fillRef>
+      <a:effectRef idx="0">
+        <a:scrgbClr r="0" g="0" b="0"/>
+      </a:effectRef>
+      <a:fontRef idx="minor"/>
+    </dgm:style>
+  </dgm:styleLbl>
+  <dgm:styleLbl name="solidFgAcc1">
+    <dgm:scene3d>
+      <a:camera prst="orthographicFront"/>
+      <a:lightRig rig="threePt" dir="t">
+        <a:rot lat="0" lon="0" rev="7500000"/>
+      </a:lightRig>
+    </dgm:scene3d>
+    <dgm:sp3d z="152400" extrusionH="63500" prstMaterial="dkEdge">
+      <a:bevelT w="120800" h="19050" prst="relaxedInset"/>
+      <a:contourClr>
+        <a:schemeClr val="bg1"/>
+      </a:contourClr>
+    </dgm:sp3d>
+    <dgm:txPr/>
+    <dgm:style>
+      <a:lnRef idx="1">
+        <a:scrgbClr r="0" g="0" b="0"/>
+      </a:lnRef>
+      <a:fillRef idx="1">
+        <a:scrgbClr r="0" g="0" b="0"/>
+      </a:fillRef>
+      <a:effectRef idx="2">
+        <a:scrgbClr r="0" g="0" b="0"/>
+      </a:effectRef>
+      <a:fontRef idx="minor"/>
+    </dgm:style>
+  </dgm:styleLbl>
+  <dgm:styleLbl name="solidAlignAcc1">
+    <dgm:scene3d>
+      <a:camera prst="orthographicFront"/>
+      <a:lightRig rig="threePt" dir="t">
+        <a:rot lat="0" lon="0" rev="7500000"/>
+      </a:lightRig>
+    </dgm:scene3d>
+    <dgm:sp3d extrusionH="190500" prstMaterial="dkEdge">
+      <a:bevelT w="120650" h="38100" prst="relaxedInset"/>
+      <a:contourClr>
+        <a:schemeClr val="bg1"/>
+      </a:contourClr>
+    </dgm:sp3d>
+    <dgm:txPr/>
+    <dgm:style>
+      <a:lnRef idx="1">
+        <a:scrgbClr r="0" g="0" b="0"/>
+      </a:lnRef>
+      <a:fillRef idx="1">
+        <a:scrgbClr r="0" g="0" b="0"/>
+      </a:fillRef>
+      <a:effectRef idx="2">
+        <a:scrgbClr r="0" g="0" b="0"/>
+      </a:effectRef>
+      <a:fontRef idx="minor"/>
+    </dgm:style>
+  </dgm:styleLbl>
+  <dgm:styleLbl name="solidBgAcc1">
+    <dgm:scene3d>
+      <a:camera prst="orthographicFront"/>
+      <a:lightRig rig="threePt" dir="t">
+        <a:rot lat="0" lon="0" rev="7500000"/>
+      </a:lightRig>
+    </dgm:scene3d>
+    <dgm:sp3d z="-152400" extrusionH="63500" prstMaterial="dkEdge">
+      <a:bevelT w="144450" h="36350" prst="relaxedInset"/>
+      <a:contourClr>
+        <a:schemeClr val="bg1"/>
+      </a:contourClr>
+    </dgm:sp3d>
+    <dgm:txPr/>
+    <dgm:style>
+      <a:lnRef idx="1">
+        <a:scrgbClr r="0" g="0" b="0"/>
+      </a:lnRef>
+      <a:fillRef idx="1">
+        <a:scrgbClr r="0" g="0" b="0"/>
+      </a:fillRef>
+      <a:effectRef idx="0">
+        <a:scrgbClr r="0" g="0" b="0"/>
+      </a:effectRef>
+      <a:fontRef idx="minor"/>
+    </dgm:style>
+  </dgm:styleLbl>
+  <dgm:styleLbl name="fgAccFollowNode1">
+    <dgm:scene3d>
+      <a:camera prst="orthographicFront"/>
+      <a:lightRig rig="threePt" dir="t">
+        <a:rot lat="0" lon="0" rev="7500000"/>
+      </a:lightRig>
+    </dgm:scene3d>
+    <dgm:sp3d z="152400" extrusionH="63500" prstMaterial="dkEdge">
+      <a:bevelT w="125400" h="36350" prst="relaxedInset"/>
+      <a:contourClr>
+        <a:schemeClr val="bg1"/>
+      </a:contourClr>
+    </dgm:sp3d>
+    <dgm:txPr/>
+    <dgm:style>
+      <a:lnRef idx="1">
+        <a:scrgbClr r="0" g="0" b="0"/>
+      </a:lnRef>
+      <a:fillRef idx="1">
+        <a:scrgbClr r="0" g="0" b="0"/>
+      </a:fillRef>
+      <a:effectRef idx="0">
+        <a:scrgbClr r="0" g="0" b="0"/>
+      </a:effectRef>
+      <a:fontRef idx="minor"/>
+    </dgm:style>
+  </dgm:styleLbl>
+  <dgm:styleLbl name="alignAccFollowNode1">
+    <dgm:scene3d>
+      <a:camera prst="orthographicFront"/>
+      <a:lightRig rig="threePt" dir="t">
+        <a:rot lat="0" lon="0" rev="7500000"/>
+      </a:lightRig>
+    </dgm:scene3d>
+    <dgm:sp3d extrusionH="190500" prstMaterial="dkEdge">
       <a:bevelT w="120650" h="38100" prst="relaxedInset"/>
       <a:bevelB w="120650" h="57150" prst="relaxedInset"/>
       <a:contourClr>
@@ -32593,7 +32917,7 @@
     </dgm:sp3d>
     <dgm:txPr/>
     <dgm:style>
-      <a:lnRef idx="0">
+      <a:lnRef idx="1">
         <a:scrgbClr r="0" g="0" b="0"/>
       </a:lnRef>
       <a:fillRef idx="1">
@@ -32605,14 +32929,150 @@
       <a:fontRef idx="minor"/>
     </dgm:style>
   </dgm:styleLbl>
-  <dgm:styleLbl name="trAlignAcc1">
+  <dgm:styleLbl name="bgAccFollowNode1">
     <dgm:scene3d>
       <a:camera prst="orthographicFront"/>
-      <a:lightRig rig="threePt" dir="t"/>
+      <a:lightRig rig="threePt" dir="t">
+        <a:rot lat="0" lon="0" rev="7500000"/>
+      </a:lightRig>
     </dgm:scene3d>
-    <dgm:sp3d extrusionH="190500" prstMaterial="matte">
-      <a:bevelT w="120650" h="38100"/>
-      <a:bevelB w="120650" h="57150" prst="relaxedInset"/>
+    <dgm:sp3d z="-152400" extrusionH="63500" prstMaterial="dkEdge">
+      <a:bevelT w="144450" h="36350" prst="relaxedInset"/>
+      <a:contourClr>
+        <a:schemeClr val="bg1"/>
+      </a:contourClr>
+    </dgm:sp3d>
+    <dgm:txPr/>
+    <dgm:style>
+      <a:lnRef idx="1">
+        <a:scrgbClr r="0" g="0" b="0"/>
+      </a:lnRef>
+      <a:fillRef idx="1">
+        <a:scrgbClr r="0" g="0" b="0"/>
+      </a:fillRef>
+      <a:effectRef idx="2">
+        <a:scrgbClr r="0" g="0" b="0"/>
+      </a:effectRef>
+      <a:fontRef idx="minor"/>
+    </dgm:style>
+  </dgm:styleLbl>
+  <dgm:styleLbl name="fgAcc0">
+    <dgm:scene3d>
+      <a:camera prst="orthographicFront"/>
+      <a:lightRig rig="threePt" dir="t">
+        <a:rot lat="0" lon="0" rev="7500000"/>
+      </a:lightRig>
+    </dgm:scene3d>
+    <dgm:sp3d z="152400" extrusionH="63500" prstMaterial="dkEdge">
+      <a:bevelT w="125400" h="36350" prst="relaxedInset"/>
+      <a:contourClr>
+        <a:schemeClr val="bg1"/>
+      </a:contourClr>
+    </dgm:sp3d>
+    <dgm:txPr/>
+    <dgm:style>
+      <a:lnRef idx="1">
+        <a:scrgbClr r="0" g="0" b="0"/>
+      </a:lnRef>
+      <a:fillRef idx="1">
+        <a:scrgbClr r="0" g="0" b="0"/>
+      </a:fillRef>
+      <a:effectRef idx="2">
+        <a:scrgbClr r="0" g="0" b="0"/>
+      </a:effectRef>
+      <a:fontRef idx="minor"/>
+    </dgm:style>
+  </dgm:styleLbl>
+  <dgm:styleLbl name="fgAcc2">
+    <dgm:scene3d>
+      <a:camera prst="orthographicFront"/>
+      <a:lightRig rig="threePt" dir="t">
+        <a:rot lat="0" lon="0" rev="7500000"/>
+      </a:lightRig>
+    </dgm:scene3d>
+    <dgm:sp3d z="152400" extrusionH="63500" prstMaterial="dkEdge">
+      <a:bevelT w="125400" h="36350" prst="relaxedInset"/>
+      <a:contourClr>
+        <a:schemeClr val="bg1"/>
+      </a:contourClr>
+    </dgm:sp3d>
+    <dgm:txPr/>
+    <dgm:style>
+      <a:lnRef idx="1">
+        <a:scrgbClr r="0" g="0" b="0"/>
+      </a:lnRef>
+      <a:fillRef idx="1">
+        <a:scrgbClr r="0" g="0" b="0"/>
+      </a:fillRef>
+      <a:effectRef idx="2">
+        <a:scrgbClr r="0" g="0" b="0"/>
+      </a:effectRef>
+      <a:fontRef idx="minor"/>
+    </dgm:style>
+  </dgm:styleLbl>
+  <dgm:styleLbl name="fgAcc3">
+    <dgm:scene3d>
+      <a:camera prst="orthographicFront"/>
+      <a:lightRig rig="threePt" dir="t">
+        <a:rot lat="0" lon="0" rev="7500000"/>
+      </a:lightRig>
+    </dgm:scene3d>
+    <dgm:sp3d z="152400" extrusionH="63500" prstMaterial="dkEdge">
+      <a:bevelT w="125400" h="36350" prst="relaxedInset"/>
+      <a:contourClr>
+        <a:schemeClr val="bg1"/>
+      </a:contourClr>
+    </dgm:sp3d>
+    <dgm:txPr/>
+    <dgm:style>
+      <a:lnRef idx="1">
+        <a:scrgbClr r="0" g="0" b="0"/>
+      </a:lnRef>
+      <a:fillRef idx="1">
+        <a:scrgbClr r="0" g="0" b="0"/>
+      </a:fillRef>
+      <a:effectRef idx="2">
+        <a:scrgbClr r="0" g="0" b="0"/>
+      </a:effectRef>
+      <a:fontRef idx="minor"/>
+    </dgm:style>
+  </dgm:styleLbl>
+  <dgm:styleLbl name="fgAcc4">
+    <dgm:scene3d>
+      <a:camera prst="orthographicFront"/>
+      <a:lightRig rig="threePt" dir="t">
+        <a:rot lat="0" lon="0" rev="7500000"/>
+      </a:lightRig>
+    </dgm:scene3d>
+    <dgm:sp3d z="152400" extrusionH="63500" prstMaterial="dkEdge">
+      <a:bevelT w="125400" h="36350" prst="relaxedInset"/>
+      <a:contourClr>
+        <a:schemeClr val="bg1"/>
+      </a:contourClr>
+    </dgm:sp3d>
+    <dgm:txPr/>
+    <dgm:style>
+      <a:lnRef idx="1">
+        <a:scrgbClr r="0" g="0" b="0"/>
+      </a:lnRef>
+      <a:fillRef idx="1">
+        <a:scrgbClr r="0" g="0" b="0"/>
+      </a:fillRef>
+      <a:effectRef idx="2">
+        <a:scrgbClr r="0" g="0" b="0"/>
+      </a:effectRef>
+      <a:fontRef idx="minor"/>
+    </dgm:style>
+  </dgm:styleLbl>
+  <dgm:styleLbl name="bgShp">
+    <dgm:scene3d>
+      <a:camera prst="orthographicFront"/>
+      <a:lightRig rig="threePt" dir="t">
+        <a:rot lat="0" lon="0" rev="7500000"/>
+      </a:lightRig>
+    </dgm:scene3d>
+    <dgm:sp3d z="-152400" extrusionH="63500" prstMaterial="matte">
+      <a:bevelT w="144450" h="6350" prst="relaxedInset"/>
       <a:contourClr>
         <a:schemeClr val="bg1"/>
       </a:contourClr>
@@ -32622,328 +33082,25 @@
       <a:lnRef idx="0">
         <a:scrgbClr r="0" g="0" b="0"/>
       </a:lnRef>
-      <a:fillRef idx="1">
+      <a:fillRef idx="3">
         <a:scrgbClr r="0" g="0" b="0"/>
       </a:fillRef>
-      <a:effectRef idx="2">
+      <a:effectRef idx="0">
         <a:scrgbClr r="0" g="0" b="0"/>
       </a:effectRef>
       <a:fontRef idx="minor"/>
     </dgm:style>
   </dgm:styleLbl>
-  <dgm:styleLbl name="bgAcc1">
-    <dgm:scene3d>
-      <a:camera prst="orthographicFront"/>
-      <a:lightRig rig="threePt" dir="t"/>
-    </dgm:scene3d>
-    <dgm:sp3d z="-152400" extrusionH="63500" prstMaterial="matte">
-      <a:bevelT w="44450" h="6350" prst="relaxedInset"/>
-      <a:contourClr>
-        <a:schemeClr val="bg1"/>
-      </a:contourClr>
-    </dgm:sp3d>
-    <dgm:txPr/>
-    <dgm:style>
-      <a:lnRef idx="0">
-        <a:scrgbClr r="0" g="0" b="0"/>
-      </a:lnRef>
-      <a:fillRef idx="1">
-        <a:scrgbClr r="0" g="0" b="0"/>
-      </a:fillRef>
-      <a:effectRef idx="0">
-        <a:scrgbClr r="0" g="0" b="0"/>
-      </a:effectRef>
-      <a:fontRef idx="minor"/>
-    </dgm:style>
-  </dgm:styleLbl>
-  <dgm:styleLbl name="solidFgAcc1">
-    <dgm:scene3d>
-      <a:camera prst="orthographicFront"/>
-      <a:lightRig rig="threePt" dir="t"/>
-    </dgm:scene3d>
-    <dgm:sp3d z="152400" extrusionH="63500" prstMaterial="matte">
-      <a:bevelT w="50800" h="19050" prst="relaxedInset"/>
-      <a:contourClr>
-        <a:schemeClr val="bg1"/>
-      </a:contourClr>
-    </dgm:sp3d>
-    <dgm:txPr/>
-    <dgm:style>
-      <a:lnRef idx="0">
-        <a:scrgbClr r="0" g="0" b="0"/>
-      </a:lnRef>
-      <a:fillRef idx="1">
-        <a:scrgbClr r="0" g="0" b="0"/>
-      </a:fillRef>
-      <a:effectRef idx="2">
-        <a:scrgbClr r="0" g="0" b="0"/>
-      </a:effectRef>
-      <a:fontRef idx="minor"/>
-    </dgm:style>
-  </dgm:styleLbl>
-  <dgm:styleLbl name="solidAlignAcc1">
-    <dgm:scene3d>
-      <a:camera prst="orthographicFront"/>
-      <a:lightRig rig="threePt" dir="t"/>
-    </dgm:scene3d>
-    <dgm:sp3d extrusionH="190500" prstMaterial="matte">
-      <a:bevelT w="120650" h="38100" prst="relaxedInset"/>
-      <a:bevelB w="120650" h="57150" prst="relaxedInset"/>
-      <a:contourClr>
-        <a:schemeClr val="bg1"/>
-      </a:contourClr>
-    </dgm:sp3d>
-    <dgm:txPr/>
-    <dgm:style>
-      <a:lnRef idx="0">
-        <a:scrgbClr r="0" g="0" b="0"/>
-      </a:lnRef>
-      <a:fillRef idx="1">
-        <a:scrgbClr r="0" g="0" b="0"/>
-      </a:fillRef>
-      <a:effectRef idx="2">
-        <a:scrgbClr r="0" g="0" b="0"/>
-      </a:effectRef>
-      <a:fontRef idx="minor"/>
-    </dgm:style>
-  </dgm:styleLbl>
-  <dgm:styleLbl name="solidBgAcc1">
-    <dgm:scene3d>
-      <a:camera prst="orthographicFront"/>
-      <a:lightRig rig="threePt" dir="t"/>
-    </dgm:scene3d>
-    <dgm:sp3d z="-152400" extrusionH="63500" prstMaterial="matte">
-      <a:bevelT w="44450" h="6350" prst="relaxedInset"/>
-      <a:contourClr>
-        <a:schemeClr val="bg1"/>
-      </a:contourClr>
-    </dgm:sp3d>
-    <dgm:txPr/>
-    <dgm:style>
-      <a:lnRef idx="0">
-        <a:scrgbClr r="0" g="0" b="0"/>
-      </a:lnRef>
-      <a:fillRef idx="1">
-        <a:scrgbClr r="0" g="0" b="0"/>
-      </a:fillRef>
-      <a:effectRef idx="0">
-        <a:scrgbClr r="0" g="0" b="0"/>
-      </a:effectRef>
-      <a:fontRef idx="minor"/>
-    </dgm:style>
-  </dgm:styleLbl>
-  <dgm:styleLbl name="fgAccFollowNode1">
-    <dgm:scene3d>
-      <a:camera prst="orthographicFront"/>
-      <a:lightRig rig="threePt" dir="t"/>
-    </dgm:scene3d>
-    <dgm:sp3d z="152400" extrusionH="63500" prstMaterial="matte">
-      <a:bevelT w="50800" h="19050" prst="relaxedInset"/>
-      <a:contourClr>
-        <a:schemeClr val="bg1"/>
-      </a:contourClr>
-    </dgm:sp3d>
-    <dgm:txPr/>
-    <dgm:style>
-      <a:lnRef idx="0">
-        <a:scrgbClr r="0" g="0" b="0"/>
-      </a:lnRef>
-      <a:fillRef idx="1">
-        <a:scrgbClr r="0" g="0" b="0"/>
-      </a:fillRef>
-      <a:effectRef idx="0">
-        <a:scrgbClr r="0" g="0" b="0"/>
-      </a:effectRef>
-      <a:fontRef idx="minor"/>
-    </dgm:style>
-  </dgm:styleLbl>
-  <dgm:styleLbl name="alignAccFollowNode1">
-    <dgm:scene3d>
-      <a:camera prst="orthographicFront"/>
-      <a:lightRig rig="threePt" dir="t"/>
-    </dgm:scene3d>
-    <dgm:sp3d extrusionH="190500" prstMaterial="matte">
-      <a:bevelT w="120650" h="38100" prst="relaxedInset"/>
-      <a:bevelB w="120650" h="57150" prst="relaxedInset"/>
-      <a:contourClr>
-        <a:schemeClr val="bg1"/>
-      </a:contourClr>
-    </dgm:sp3d>
-    <dgm:txPr/>
-    <dgm:style>
-      <a:lnRef idx="0">
-        <a:scrgbClr r="0" g="0" b="0"/>
-      </a:lnRef>
-      <a:fillRef idx="1">
-        <a:scrgbClr r="0" g="0" b="0"/>
-      </a:fillRef>
-      <a:effectRef idx="2">
-        <a:scrgbClr r="0" g="0" b="0"/>
-      </a:effectRef>
-      <a:fontRef idx="minor"/>
-    </dgm:style>
-  </dgm:styleLbl>
-  <dgm:styleLbl name="bgAccFollowNode1">
-    <dgm:scene3d>
-      <a:camera prst="orthographicFront"/>
-      <a:lightRig rig="threePt" dir="t"/>
-    </dgm:scene3d>
-    <dgm:sp3d z="-152400" extrusionH="63500" prstMaterial="matte">
-      <a:bevelT w="44450" h="6350" prst="relaxedInset"/>
-      <a:contourClr>
-        <a:schemeClr val="bg1"/>
-      </a:contourClr>
-    </dgm:sp3d>
-    <dgm:txPr/>
-    <dgm:style>
-      <a:lnRef idx="0">
-        <a:scrgbClr r="0" g="0" b="0"/>
-      </a:lnRef>
-      <a:fillRef idx="1">
-        <a:scrgbClr r="0" g="0" b="0"/>
-      </a:fillRef>
-      <a:effectRef idx="2">
-        <a:scrgbClr r="0" g="0" b="0"/>
-      </a:effectRef>
-      <a:fontRef idx="minor"/>
-    </dgm:style>
-  </dgm:styleLbl>
-  <dgm:styleLbl name="fgAcc0">
-    <dgm:scene3d>
-      <a:camera prst="orthographicFront"/>
-      <a:lightRig rig="threePt" dir="t"/>
-    </dgm:scene3d>
-    <dgm:sp3d z="152400" extrusionH="63500" prstMaterial="matte">
-      <a:bevelT w="50800" h="19050" prst="relaxedInset"/>
-      <a:contourClr>
-        <a:schemeClr val="bg1"/>
-      </a:contourClr>
-    </dgm:sp3d>
-    <dgm:txPr/>
-    <dgm:style>
-      <a:lnRef idx="0">
-        <a:scrgbClr r="0" g="0" b="0"/>
-      </a:lnRef>
-      <a:fillRef idx="1">
-        <a:scrgbClr r="0" g="0" b="0"/>
-      </a:fillRef>
-      <a:effectRef idx="0">
-        <a:scrgbClr r="0" g="0" b="0"/>
-      </a:effectRef>
-      <a:fontRef idx="minor"/>
-    </dgm:style>
-  </dgm:styleLbl>
-  <dgm:styleLbl name="fgAcc2">
-    <dgm:scene3d>
-      <a:camera prst="orthographicFront"/>
-      <a:lightRig rig="threePt" dir="t"/>
-    </dgm:scene3d>
-    <dgm:sp3d z="152400" extrusionH="63500" prstMaterial="matte">
-      <a:bevelT w="50800" h="19050" prst="relaxedInset"/>
-      <a:contourClr>
-        <a:schemeClr val="bg1"/>
-      </a:contourClr>
-    </dgm:sp3d>
-    <dgm:txPr/>
-    <dgm:style>
-      <a:lnRef idx="0">
-        <a:scrgbClr r="0" g="0" b="0"/>
-      </a:lnRef>
-      <a:fillRef idx="1">
-        <a:scrgbClr r="0" g="0" b="0"/>
-      </a:fillRef>
-      <a:effectRef idx="0">
-        <a:scrgbClr r="0" g="0" b="0"/>
-      </a:effectRef>
-      <a:fontRef idx="minor"/>
-    </dgm:style>
-  </dgm:styleLbl>
-  <dgm:styleLbl name="fgAcc3">
-    <dgm:scene3d>
-      <a:camera prst="orthographicFront"/>
-      <a:lightRig rig="threePt" dir="t"/>
-    </dgm:scene3d>
-    <dgm:sp3d z="152400" extrusionH="63500" prstMaterial="matte">
-      <a:bevelT w="50800" h="19050" prst="relaxedInset"/>
-      <a:contourClr>
-        <a:schemeClr val="bg1"/>
-      </a:contourClr>
-    </dgm:sp3d>
-    <dgm:txPr/>
-    <dgm:style>
-      <a:lnRef idx="0">
-        <a:scrgbClr r="0" g="0" b="0"/>
-      </a:lnRef>
-      <a:fillRef idx="1">
-        <a:scrgbClr r="0" g="0" b="0"/>
-      </a:fillRef>
-      <a:effectRef idx="0">
-        <a:scrgbClr r="0" g="0" b="0"/>
-      </a:effectRef>
-      <a:fontRef idx="minor"/>
-    </dgm:style>
-  </dgm:styleLbl>
-  <dgm:styleLbl name="fgAcc4">
-    <dgm:scene3d>
-      <a:camera prst="orthographicFront"/>
-      <a:lightRig rig="threePt" dir="t"/>
-    </dgm:scene3d>
-    <dgm:sp3d z="152400" extrusionH="63500" prstMaterial="matte">
-      <a:bevelT w="50800" h="19050" prst="relaxedInset"/>
-      <a:contourClr>
-        <a:schemeClr val="bg1"/>
-      </a:contourClr>
-    </dgm:sp3d>
-    <dgm:txPr/>
-    <dgm:style>
-      <a:lnRef idx="0">
-        <a:scrgbClr r="0" g="0" b="0"/>
-      </a:lnRef>
-      <a:fillRef idx="1">
-        <a:scrgbClr r="0" g="0" b="0"/>
-      </a:fillRef>
-      <a:effectRef idx="0">
-        <a:scrgbClr r="0" g="0" b="0"/>
-      </a:effectRef>
-      <a:fontRef idx="minor"/>
-    </dgm:style>
-  </dgm:styleLbl>
-  <dgm:styleLbl name="bgShp">
-    <dgm:scene3d>
-      <a:camera prst="orthographicFront"/>
-      <a:lightRig rig="threePt" dir="t"/>
-    </dgm:scene3d>
-    <dgm:sp3d z="-152400" extrusionH="63500" prstMaterial="matte">
-      <a:bevelT w="44450" h="6350" prst="relaxedInset"/>
-      <a:contourClr>
-        <a:schemeClr val="bg1"/>
-      </a:contourClr>
-    </dgm:sp3d>
-    <dgm:txPr/>
-    <dgm:style>
-      <a:lnRef idx="0">
-        <a:scrgbClr r="0" g="0" b="0"/>
-      </a:lnRef>
-      <a:fillRef idx="1">
-        <a:scrgbClr r="0" g="0" b="0"/>
-      </a:fillRef>
-      <a:effectRef idx="0">
-        <a:scrgbClr r="0" g="0" b="0"/>
-      </a:effectRef>
-      <a:fontRef idx="minor"/>
-    </dgm:style>
-  </dgm:styleLbl>
   <dgm:styleLbl name="dkBgShp">
     <dgm:scene3d>
       <a:camera prst="orthographicFront"/>
-      <a:lightRig rig="threePt" dir="t"/>
+      <a:lightRig rig="threePt" dir="t">
+        <a:rot lat="0" lon="0" rev="7500000"/>
+      </a:lightRig>
     </dgm:scene3d>
-    <dgm:sp3d extrusionH="190500" prstMaterial="matte">
-      <a:bevelT w="120650" h="38100" prst="relaxedInset"/>
-      <a:bevelB w="120650" h="57150" prst="relaxedInset"/>
-      <a:contourClr>
-        <a:schemeClr val="bg1"/>
-      </a:contourClr>
+    <dgm:sp3d prstMaterial="plastic">
+      <a:bevelT w="127000" h="25400" prst="relaxedInset"/>
+      <a:bevelB w="88900" h="121750" prst="angle"/>
     </dgm:sp3d>
     <dgm:txPr/>
     <dgm:style>
@@ -32984,7 +33141,9 @@
   <dgm:styleLbl name="fgShp">
     <dgm:scene3d>
       <a:camera prst="orthographicFront"/>
-      <a:lightRig rig="threePt" dir="t"/>
+      <a:lightRig rig="threePt" dir="t">
+        <a:rot lat="0" lon="0" rev="7500000"/>
+      </a:lightRig>
     </dgm:scene3d>
     <dgm:sp3d z="152400" extrusionH="63500" prstMaterial="matte">
       <a:bevelT w="50800" h="19050" prst="relaxedInset"/>
@@ -37447,7 +37606,7 @@
             <p:ph idx="1"/>
             <p:extLst>
               <p:ext uri="{D42A27DB-BD31-4B8C-83A1-F6EECF244321}">
-                <p14:modId xmlns:p14="http://schemas.microsoft.com/office/powerpoint/2010/main" val="3454708397"/>
+                <p14:modId xmlns:p14="http://schemas.microsoft.com/office/powerpoint/2010/main" val="121883132"/>
               </p:ext>
             </p:extLst>
           </p:nvPr>
@@ -37834,6 +37993,52 @@
           </a:extLst>
         </p:spPr>
       </p:pic>
+      <p:sp>
+        <p:nvSpPr>
+          <p:cNvPr id="6" name="Elipse 5"/>
+          <p:cNvSpPr/>
+          <p:nvPr/>
+        </p:nvSpPr>
+        <p:spPr>
+          <a:xfrm>
+            <a:off x="6228184" y="4869160"/>
+            <a:ext cx="3384376" cy="1988840"/>
+          </a:xfrm>
+          <a:prstGeom prst="ellipse">
+            <a:avLst/>
+          </a:prstGeom>
+          <a:noFill/>
+          <a:ln>
+            <a:solidFill>
+              <a:srgbClr val="C00000"/>
+            </a:solidFill>
+          </a:ln>
+        </p:spPr>
+        <p:style>
+          <a:lnRef idx="2">
+            <a:schemeClr val="accent1">
+              <a:shade val="50000"/>
+            </a:schemeClr>
+          </a:lnRef>
+          <a:fillRef idx="1">
+            <a:schemeClr val="accent1"/>
+          </a:fillRef>
+          <a:effectRef idx="0">
+            <a:schemeClr val="accent1"/>
+          </a:effectRef>
+          <a:fontRef idx="minor">
+            <a:schemeClr val="lt1"/>
+          </a:fontRef>
+        </p:style>
+        <p:txBody>
+          <a:bodyPr rtlCol="0" anchor="ctr"/>
+          <a:lstStyle/>
+          <a:p>
+            <a:pPr algn="ctr"/>
+            <a:endParaRPr lang="pt-BR"/>
+          </a:p>
+        </p:txBody>
+      </p:sp>
     </p:spTree>
     <p:extLst>
       <p:ext uri="{BB962C8B-B14F-4D97-AF65-F5344CB8AC3E}">
@@ -40749,7 +40954,7 @@
             </a:pPr>
             <a:r>
               <a:rPr lang="pt-BR" b="1" dirty="0" err="1" smtClean="0"/>
-              <a:t>Heroko</a:t>
+              <a:t>Heroku</a:t>
             </a:r>
             <a:endParaRPr lang="pt-BR" b="1" dirty="0" smtClean="0"/>
           </a:p>
@@ -41612,17 +41817,7 @@
                   </a:schemeClr>
                 </a:solidFill>
               </a:rPr>
-              <a:t>Obs. Os quadros em verde destacam ações de usuário (</a:t>
-            </a:r>
-            <a:r>
-              <a:rPr lang="pt-BR" dirty="0" smtClean="0">
-                <a:solidFill>
-                  <a:schemeClr val="accent5">
-                    <a:lumMod val="75000"/>
-                  </a:schemeClr>
-                </a:solidFill>
-              </a:rPr>
-              <a:t>Clicks)</a:t>
+              <a:t>Obs. Os quadros em verde destacam ações de usuário (Clicks)</a:t>
             </a:r>
             <a:endParaRPr lang="pt-BR" dirty="0">
               <a:solidFill>

</xml_diff>